<commit_message>
minor formatting change to one slide
</commit_message>
<xml_diff>
--- a/PowerPoints/15 - Strings.pptx
+++ b/PowerPoints/15 - Strings.pptx
@@ -6522,8 +6522,8 @@
         </p:nvSpPr>
         <p:spPr>
           <a:xfrm>
-            <a:off x="3847578" y="3022600"/>
-            <a:ext cx="3074880" cy="400110"/>
+            <a:off x="3498925" y="3022600"/>
+            <a:ext cx="3772188" cy="400110"/>
           </a:xfrm>
           <a:prstGeom prst="rect">
             <a:avLst/>
@@ -6543,7 +6543,7 @@
           <a:p>
             <a:r>
               <a:rPr lang="en-US" sz="2000" dirty="0"/>
-              <a:t>Note computation of size.</a:t>
+              <a:t>Note computation string of size.</a:t>
             </a:r>
           </a:p>
         </p:txBody>
@@ -6632,9 +6632,9 @@
           <p:nvPr/>
         </p:nvCxnSpPr>
         <p:spPr bwMode="auto">
-          <a:xfrm flipV="1">
+          <a:xfrm flipH="1" flipV="1">
             <a:off x="5385018" y="2376055"/>
-            <a:ext cx="0" cy="646545"/>
+            <a:ext cx="1" cy="646545"/>
           </a:xfrm>
           <a:prstGeom prst="straightConnector1">
             <a:avLst/>
@@ -6979,7 +6979,7 @@
         </p:nvSpPr>
         <p:spPr>
           <a:xfrm>
-            <a:off x="1690442" y="5200262"/>
+            <a:off x="1235189" y="5200262"/>
             <a:ext cx="6673622" cy="1015663"/>
           </a:xfrm>
           <a:prstGeom prst="rect">
@@ -10558,7 +10558,7 @@
             <a:pPr lvl="1"/>
             <a:r>
               <a:rPr lang="en-US" dirty="0"/>
-              <a:t>string literals are enclosed in (double) quotation marks</a:t>
+              <a:t>String literals are enclosed in (double) quotation marks.</a:t>
             </a:r>
           </a:p>
           <a:p>
@@ -10574,7 +10574,7 @@
             <a:pPr lvl="1"/>
             <a:r>
               <a:rPr lang="en-US" dirty="0"/>
-              <a:t>string variable has two integer properties</a:t>
+              <a:t>A string variable has two integer properties.</a:t>
             </a:r>
           </a:p>
           <a:p>

</xml_diff>

<commit_message>
minor edits to one slide
</commit_message>
<xml_diff>
--- a/PowerPoints/15 - Strings.pptx
+++ b/PowerPoints/15 - Strings.pptx
@@ -10566,8 +10566,10 @@
               <a:buNone/>
             </a:pPr>
             <a:r>
-              <a:rPr lang="en-US" dirty="0"/>
-              <a:t>"Hello, world.“</a:t>
+              <a:rPr lang="en-US" dirty="0">
+                <a:latin typeface="Consolas" panose="020B0609020204030204" pitchFamily="49" charset="0"/>
+              </a:rPr>
+              <a:t>"Hello, world."</a:t>
             </a:r>
           </a:p>
           <a:p>

</xml_diff>

<commit_message>
minor updates to slides on Strings
</commit_message>
<xml_diff>
--- a/PowerPoints/15 - Strings.pptx
+++ b/PowerPoints/15 - Strings.pptx
@@ -410,8 +410,8 @@
               <a:defRPr/>
             </a:pPr>
             <a:r>
-              <a:rPr lang="en-US"/>
-              <a:t>Arrays</a:t>
+              <a:rPr lang="en-US" dirty="0"/>
+              <a:t>Strings</a:t>
             </a:r>
           </a:p>
         </p:txBody>
@@ -830,8 +830,8 @@
           <a:lstStyle/>
           <a:p>
             <a:r>
-              <a:rPr lang="en-US"/>
-              <a:t>Arrays</a:t>
+              <a:rPr lang="en-US" dirty="0"/>
+              <a:t>Strings</a:t>
             </a:r>
           </a:p>
         </p:txBody>
@@ -981,8 +981,8 @@
               <a:defRPr/>
             </a:pPr>
             <a:r>
-              <a:rPr lang="en-US"/>
-              <a:t>Arrays</a:t>
+              <a:rPr lang="en-US" dirty="0"/>
+              <a:t>Strings</a:t>
             </a:r>
           </a:p>
         </p:txBody>
@@ -1098,8 +1098,8 @@
               <a:defRPr/>
             </a:pPr>
             <a:r>
-              <a:rPr lang="en-US"/>
-              <a:t>Arrays</a:t>
+              <a:rPr lang="en-US" dirty="0"/>
+              <a:t>Strings</a:t>
             </a:r>
           </a:p>
         </p:txBody>
@@ -1215,8 +1215,8 @@
               <a:defRPr/>
             </a:pPr>
             <a:r>
-              <a:rPr lang="en-US"/>
-              <a:t>Arrays</a:t>
+              <a:rPr lang="en-US" dirty="0"/>
+              <a:t>Strings</a:t>
             </a:r>
           </a:p>
         </p:txBody>
@@ -1568,8 +1568,8 @@
               <a:defRPr/>
             </a:pPr>
             <a:r>
-              <a:rPr lang="en-US"/>
-              <a:t>Arrays</a:t>
+              <a:rPr lang="en-US" dirty="0"/>
+              <a:t>Strings</a:t>
             </a:r>
           </a:p>
         </p:txBody>
@@ -1685,8 +1685,8 @@
               <a:defRPr/>
             </a:pPr>
             <a:r>
-              <a:rPr lang="en-US"/>
-              <a:t>Arrays</a:t>
+              <a:rPr lang="en-US" dirty="0"/>
+              <a:t>Strings</a:t>
             </a:r>
           </a:p>
         </p:txBody>
@@ -1802,8 +1802,8 @@
               <a:defRPr/>
             </a:pPr>
             <a:r>
-              <a:rPr lang="en-US"/>
-              <a:t>Arrays</a:t>
+              <a:rPr lang="en-US" dirty="0"/>
+              <a:t>Strings</a:t>
             </a:r>
           </a:p>
         </p:txBody>
@@ -1921,8 +1921,8 @@
           <a:lstStyle/>
           <a:p>
             <a:r>
-              <a:rPr lang="en-US"/>
-              <a:t>Arrays</a:t>
+              <a:rPr lang="en-US" dirty="0"/>
+              <a:t>Strings</a:t>
             </a:r>
           </a:p>
         </p:txBody>
@@ -2037,8 +2037,8 @@
           <a:lstStyle/>
           <a:p>
             <a:r>
-              <a:rPr lang="en-US"/>
-              <a:t>Arrays</a:t>
+              <a:rPr lang="en-US" dirty="0"/>
+              <a:t>Strings</a:t>
             </a:r>
           </a:p>
         </p:txBody>
@@ -2151,8 +2151,8 @@
               <a:defRPr/>
             </a:pPr>
             <a:r>
-              <a:rPr lang="en-US"/>
-              <a:t>Arrays</a:t>
+              <a:rPr lang="en-US" dirty="0"/>
+              <a:t>Strings</a:t>
             </a:r>
           </a:p>
         </p:txBody>
@@ -2268,8 +2268,8 @@
               <a:defRPr/>
             </a:pPr>
             <a:r>
-              <a:rPr lang="en-US"/>
-              <a:t>Arrays</a:t>
+              <a:rPr lang="en-US" dirty="0"/>
+              <a:t>Strings</a:t>
             </a:r>
           </a:p>
         </p:txBody>
@@ -2385,8 +2385,8 @@
               <a:defRPr/>
             </a:pPr>
             <a:r>
-              <a:rPr lang="en-US"/>
-              <a:t>Arrays</a:t>
+              <a:rPr lang="en-US" dirty="0"/>
+              <a:t>Strings</a:t>
             </a:r>
           </a:p>
         </p:txBody>
@@ -2502,8 +2502,8 @@
               <a:defRPr/>
             </a:pPr>
             <a:r>
-              <a:rPr lang="en-US"/>
-              <a:t>Arrays</a:t>
+              <a:rPr lang="en-US" dirty="0"/>
+              <a:t>Strings</a:t>
             </a:r>
           </a:p>
         </p:txBody>
@@ -2619,8 +2619,8 @@
               <a:defRPr/>
             </a:pPr>
             <a:r>
-              <a:rPr lang="en-US"/>
-              <a:t>Arrays</a:t>
+              <a:rPr lang="en-US" dirty="0"/>
+              <a:t>Strings</a:t>
             </a:r>
           </a:p>
         </p:txBody>
@@ -10065,7 +10065,7 @@
             </a:r>
             <a:r>
               <a:rPr lang="en-US" dirty="0"/>
-              <a:t> must generate code to leave the relative address of the variable on the run-time stack (i.e., the address of the first byte of the array)</a:t>
+              <a:t> must generate code to leave the relative address of the variable on the run-time stack (i.e., the address of the first byte of the string)</a:t>
             </a:r>
           </a:p>
           <a:p>

</xml_diff>